<commit_message>
finalização dos slides de requisitos
</commit_message>
<xml_diff>
--- a/producao-de-jogos-digitais/producao-de-jogos-digitais_requisitos.pptx
+++ b/producao-de-jogos-digitais/producao-de-jogos-digitais_requisitos.pptx
@@ -5,7 +5,7 @@
     <p:sldMasterId id="2147483648" r:id="rId1"/>
   </p:sldMasterIdLst>
   <p:notesMasterIdLst>
-    <p:notesMasterId r:id="rId24"/>
+    <p:notesMasterId r:id="rId23"/>
   </p:notesMasterIdLst>
   <p:sldIdLst>
     <p:sldId id="256" r:id="rId2"/>
@@ -28,8 +28,7 @@
     <p:sldId id="434" r:id="rId19"/>
     <p:sldId id="432" r:id="rId20"/>
     <p:sldId id="435" r:id="rId21"/>
-    <p:sldId id="436" r:id="rId22"/>
-    <p:sldId id="408" r:id="rId23"/>
+    <p:sldId id="408" r:id="rId22"/>
   </p:sldIdLst>
   <p:sldSz cx="12192000" cy="6858000"/>
   <p:notesSz cx="6858000" cy="9144000"/>
@@ -4580,90 +4579,6 @@
     </p:spTree>
     <p:extLst>
       <p:ext uri="{BB962C8B-B14F-4D97-AF65-F5344CB8AC3E}">
-        <p14:creationId xmlns:p14="http://schemas.microsoft.com/office/powerpoint/2010/main" val="1749139568"/>
-      </p:ext>
-    </p:extLst>
-  </p:cSld>
-  <p:clrMapOvr>
-    <a:masterClrMapping/>
-  </p:clrMapOvr>
-</p:notes>
-</file>
-
-<file path=ppt/notesSlides/notesSlide22.xml><?xml version="1.0" encoding="utf-8"?>
-<p:notes xmlns:a="http://schemas.openxmlformats.org/drawingml/2006/main" xmlns:r="http://schemas.openxmlformats.org/officeDocument/2006/relationships" xmlns:p="http://schemas.openxmlformats.org/presentationml/2006/main">
-  <p:cSld>
-    <p:spTree>
-      <p:nvGrpSpPr>
-        <p:cNvPr id="1" name=""/>
-        <p:cNvGrpSpPr/>
-        <p:nvPr/>
-      </p:nvGrpSpPr>
-      <p:grpSpPr>
-        <a:xfrm>
-          <a:off x="0" y="0"/>
-          <a:ext cx="0" cy="0"/>
-          <a:chOff x="0" y="0"/>
-          <a:chExt cx="0" cy="0"/>
-        </a:xfrm>
-      </p:grpSpPr>
-      <p:sp>
-        <p:nvSpPr>
-          <p:cNvPr id="2" name="Slide Image Placeholder 1"/>
-          <p:cNvSpPr>
-            <a:spLocks noGrp="1" noRot="1" noChangeAspect="1"/>
-          </p:cNvSpPr>
-          <p:nvPr>
-            <p:ph type="sldImg"/>
-          </p:nvPr>
-        </p:nvSpPr>
-        <p:spPr/>
-      </p:sp>
-      <p:sp>
-        <p:nvSpPr>
-          <p:cNvPr id="3" name="Notes Placeholder 2"/>
-          <p:cNvSpPr>
-            <a:spLocks noGrp="1"/>
-          </p:cNvSpPr>
-          <p:nvPr>
-            <p:ph type="body" idx="1"/>
-          </p:nvPr>
-        </p:nvSpPr>
-        <p:spPr/>
-        <p:txBody>
-          <a:bodyPr/>
-          <a:lstStyle/>
-          <a:p>
-            <a:endParaRPr lang="en-US" dirty="0"/>
-          </a:p>
-        </p:txBody>
-      </p:sp>
-      <p:sp>
-        <p:nvSpPr>
-          <p:cNvPr id="4" name="Slide Number Placeholder 3"/>
-          <p:cNvSpPr>
-            <a:spLocks noGrp="1"/>
-          </p:cNvSpPr>
-          <p:nvPr>
-            <p:ph type="sldNum" sz="quarter" idx="5"/>
-          </p:nvPr>
-        </p:nvSpPr>
-        <p:spPr/>
-        <p:txBody>
-          <a:bodyPr/>
-          <a:lstStyle/>
-          <a:p>
-            <a:fld id="{020F486D-935E-4125-8FD7-C735663CC7DE}" type="slidenum">
-              <a:rPr lang="pt-BR" smtClean="0"/>
-              <a:t>22</a:t>
-            </a:fld>
-            <a:endParaRPr lang="pt-BR"/>
-          </a:p>
-        </p:txBody>
-      </p:sp>
-    </p:spTree>
-    <p:extLst>
-      <p:ext uri="{BB962C8B-B14F-4D97-AF65-F5344CB8AC3E}">
         <p14:creationId xmlns:p14="http://schemas.microsoft.com/office/powerpoint/2010/main" val="2411581045"/>
       </p:ext>
     </p:extLst>
@@ -10017,6 +9932,126 @@
           </a:bodyPr>
           <a:lstStyle/>
           <a:p>
+            <a:pPr marL="457200" indent="-457200" algn="l">
+              <a:buFont typeface="Arial" panose="020B0604020202020204" pitchFamily="34" charset="0"/>
+              <a:buChar char="•"/>
+            </a:pPr>
+            <a:r>
+              <a:rPr lang="pt-BR" b="1" dirty="0" err="1" smtClean="0"/>
+              <a:t>Unity</a:t>
+            </a:r>
+            <a:r>
+              <a:rPr lang="pt-BR" dirty="0" smtClean="0"/>
+              <a:t>: gerenciamento de </a:t>
+            </a:r>
+            <a:r>
+              <a:rPr lang="pt-BR" i="1" dirty="0" err="1" smtClean="0"/>
+              <a:t>assets</a:t>
+            </a:r>
+            <a:r>
+              <a:rPr lang="pt-BR" dirty="0" smtClean="0"/>
+              <a:t> e geração de </a:t>
+            </a:r>
+            <a:r>
+              <a:rPr lang="pt-BR" i="1" dirty="0" smtClean="0"/>
+              <a:t>builds</a:t>
+            </a:r>
+            <a:r>
+              <a:rPr lang="pt-BR" dirty="0" smtClean="0"/>
+              <a:t>;</a:t>
+            </a:r>
+          </a:p>
+          <a:p>
+            <a:pPr marL="457200" indent="-457200" algn="l">
+              <a:buFont typeface="Arial" panose="020B0604020202020204" pitchFamily="34" charset="0"/>
+              <a:buChar char="•"/>
+            </a:pPr>
+            <a:r>
+              <a:rPr lang="pt-BR" b="1" dirty="0" smtClean="0"/>
+              <a:t>Visual Studio</a:t>
+            </a:r>
+            <a:r>
+              <a:rPr lang="pt-BR" dirty="0" smtClean="0"/>
+              <a:t>: desenvolvimento de </a:t>
+            </a:r>
+            <a:r>
+              <a:rPr lang="pt-BR" i="1" dirty="0" smtClean="0"/>
+              <a:t>scripts</a:t>
+            </a:r>
+            <a:r>
+              <a:rPr lang="pt-BR" dirty="0" smtClean="0"/>
+              <a:t>;</a:t>
+            </a:r>
+          </a:p>
+          <a:p>
+            <a:pPr marL="457200" indent="-457200" algn="l">
+              <a:buFont typeface="Arial" panose="020B0604020202020204" pitchFamily="34" charset="0"/>
+              <a:buChar char="•"/>
+            </a:pPr>
+            <a:r>
+              <a:rPr lang="pt-BR" b="1" dirty="0" smtClean="0"/>
+              <a:t>Photoshop e </a:t>
+            </a:r>
+            <a:r>
+              <a:rPr lang="pt-BR" b="1" dirty="0" err="1" smtClean="0"/>
+              <a:t>Illustrator</a:t>
+            </a:r>
+            <a:r>
+              <a:rPr lang="pt-BR" dirty="0" smtClean="0"/>
+              <a:t>: criação de </a:t>
+            </a:r>
+            <a:r>
+              <a:rPr lang="pt-BR" i="1" dirty="0" err="1" smtClean="0"/>
+              <a:t>assets</a:t>
+            </a:r>
+            <a:r>
+              <a:rPr lang="pt-BR" dirty="0" smtClean="0"/>
+              <a:t> 2D;</a:t>
+            </a:r>
+          </a:p>
+          <a:p>
+            <a:pPr marL="457200" indent="-457200" algn="l">
+              <a:buFont typeface="Arial" panose="020B0604020202020204" pitchFamily="34" charset="0"/>
+              <a:buChar char="•"/>
+            </a:pPr>
+            <a:r>
+              <a:rPr lang="pt-BR" b="1" dirty="0" smtClean="0"/>
+              <a:t>3ds Max</a:t>
+            </a:r>
+            <a:r>
+              <a:rPr lang="pt-BR" dirty="0" smtClean="0"/>
+              <a:t>: criação de </a:t>
+            </a:r>
+            <a:r>
+              <a:rPr lang="pt-BR" i="1" dirty="0" err="1" smtClean="0"/>
+              <a:t>assets</a:t>
+            </a:r>
+            <a:r>
+              <a:rPr lang="pt-BR" dirty="0" smtClean="0"/>
+              <a:t> 3D; e</a:t>
+            </a:r>
+          </a:p>
+          <a:p>
+            <a:pPr marL="457200" indent="-457200" algn="l">
+              <a:buFont typeface="Arial" panose="020B0604020202020204" pitchFamily="34" charset="0"/>
+              <a:buChar char="•"/>
+            </a:pPr>
+            <a:r>
+              <a:rPr lang="pt-BR" b="1" dirty="0" err="1" smtClean="0"/>
+              <a:t>Audacity</a:t>
+            </a:r>
+            <a:r>
+              <a:rPr lang="pt-BR" dirty="0" smtClean="0"/>
+              <a:t>: criação e edição de </a:t>
+            </a:r>
+            <a:r>
+              <a:rPr lang="pt-BR" i="1" dirty="0" err="1" smtClean="0"/>
+              <a:t>assets</a:t>
+            </a:r>
+            <a:r>
+              <a:rPr lang="pt-BR" dirty="0" smtClean="0"/>
+              <a:t> de áudio.</a:t>
+            </a:r>
             <a:endParaRPr lang="pt-BR" dirty="0"/>
           </a:p>
         </p:txBody>
@@ -10035,85 +10070,6 @@
 </file>
 
 <file path=ppt/slides/slide21.xml><?xml version="1.0" encoding="utf-8"?>
-<p:sld xmlns:a="http://schemas.openxmlformats.org/drawingml/2006/main" xmlns:r="http://schemas.openxmlformats.org/officeDocument/2006/relationships" xmlns:p="http://schemas.openxmlformats.org/presentationml/2006/main">
-  <p:cSld>
-    <p:spTree>
-      <p:nvGrpSpPr>
-        <p:cNvPr id="1" name=""/>
-        <p:cNvGrpSpPr/>
-        <p:nvPr/>
-      </p:nvGrpSpPr>
-      <p:grpSpPr>
-        <a:xfrm>
-          <a:off x="0" y="0"/>
-          <a:ext cx="0" cy="0"/>
-          <a:chOff x="0" y="0"/>
-          <a:chExt cx="0" cy="0"/>
-        </a:xfrm>
-      </p:grpSpPr>
-      <p:sp>
-        <p:nvSpPr>
-          <p:cNvPr id="5" name="Título 4"/>
-          <p:cNvSpPr>
-            <a:spLocks noGrp="1"/>
-          </p:cNvSpPr>
-          <p:nvPr>
-            <p:ph type="title"/>
-          </p:nvPr>
-        </p:nvSpPr>
-        <p:spPr/>
-        <p:txBody>
-          <a:bodyPr/>
-          <a:lstStyle/>
-          <a:p>
-            <a:r>
-              <a:rPr lang="pt-BR" dirty="0" smtClean="0"/>
-              <a:t>Definição do Pipeline</a:t>
-            </a:r>
-            <a:endParaRPr lang="pt-BR" dirty="0"/>
-          </a:p>
-        </p:txBody>
-      </p:sp>
-      <p:sp>
-        <p:nvSpPr>
-          <p:cNvPr id="6" name="Espaço Reservado para Conteúdo 5"/>
-          <p:cNvSpPr>
-            <a:spLocks noGrp="1"/>
-          </p:cNvSpPr>
-          <p:nvPr>
-            <p:ph idx="1"/>
-          </p:nvPr>
-        </p:nvSpPr>
-        <p:spPr>
-          <a:xfrm>
-            <a:off x="317694" y="1291052"/>
-            <a:ext cx="11705493" cy="4930133"/>
-          </a:xfrm>
-        </p:spPr>
-        <p:txBody>
-          <a:bodyPr>
-            <a:normAutofit/>
-          </a:bodyPr>
-          <a:lstStyle/>
-          <a:p>
-            <a:endParaRPr lang="pt-BR" dirty="0"/>
-          </a:p>
-        </p:txBody>
-      </p:sp>
-    </p:spTree>
-    <p:extLst>
-      <p:ext uri="{BB962C8B-B14F-4D97-AF65-F5344CB8AC3E}">
-        <p14:creationId xmlns:p14="http://schemas.microsoft.com/office/powerpoint/2010/main" val="1305256705"/>
-      </p:ext>
-    </p:extLst>
-  </p:cSld>
-  <p:clrMapOvr>
-    <a:masterClrMapping/>
-  </p:clrMapOvr>
-</p:sld>
-</file>
-
-<file path=ppt/slides/slide22.xml><?xml version="1.0" encoding="utf-8"?>
 <p:sld xmlns:a="http://schemas.openxmlformats.org/drawingml/2006/main" xmlns:r="http://schemas.openxmlformats.org/officeDocument/2006/relationships" xmlns:p="http://schemas.openxmlformats.org/presentationml/2006/main">
   <p:cSld>
     <p:spTree>

</xml_diff>

<commit_message>
exclusão do slide que menciona o jogo da WHIP como exemplo de aplicação
</commit_message>
<xml_diff>
--- a/producao-de-jogos-digitais/producao-de-jogos-digitais_requisitos.pptx
+++ b/producao-de-jogos-digitais/producao-de-jogos-digitais_requisitos.pptx
@@ -5,7 +5,7 @@
     <p:sldMasterId id="2147483648" r:id="rId1"/>
   </p:sldMasterIdLst>
   <p:notesMasterIdLst>
-    <p:notesMasterId r:id="rId23"/>
+    <p:notesMasterId r:id="rId22"/>
   </p:notesMasterIdLst>
   <p:sldIdLst>
     <p:sldId id="256" r:id="rId2"/>
@@ -16,19 +16,18 @@
     <p:sldId id="367" r:id="rId7"/>
     <p:sldId id="369" r:id="rId8"/>
     <p:sldId id="368" r:id="rId9"/>
-    <p:sldId id="387" r:id="rId10"/>
-    <p:sldId id="427" r:id="rId11"/>
-    <p:sldId id="420" r:id="rId12"/>
-    <p:sldId id="388" r:id="rId13"/>
-    <p:sldId id="428" r:id="rId14"/>
-    <p:sldId id="429" r:id="rId15"/>
-    <p:sldId id="430" r:id="rId16"/>
-    <p:sldId id="431" r:id="rId17"/>
-    <p:sldId id="433" r:id="rId18"/>
-    <p:sldId id="434" r:id="rId19"/>
-    <p:sldId id="432" r:id="rId20"/>
-    <p:sldId id="435" r:id="rId21"/>
-    <p:sldId id="408" r:id="rId22"/>
+    <p:sldId id="427" r:id="rId10"/>
+    <p:sldId id="420" r:id="rId11"/>
+    <p:sldId id="388" r:id="rId12"/>
+    <p:sldId id="428" r:id="rId13"/>
+    <p:sldId id="429" r:id="rId14"/>
+    <p:sldId id="430" r:id="rId15"/>
+    <p:sldId id="431" r:id="rId16"/>
+    <p:sldId id="433" r:id="rId17"/>
+    <p:sldId id="434" r:id="rId18"/>
+    <p:sldId id="432" r:id="rId19"/>
+    <p:sldId id="435" r:id="rId20"/>
+    <p:sldId id="408" r:id="rId21"/>
   </p:sldIdLst>
   <p:sldSz cx="12192000" cy="6858000"/>
   <p:notesSz cx="6858000" cy="9144000"/>
@@ -3146,7 +3145,7 @@
           <a:p>
             <a:fld id="{94D3EB41-CF60-4C9F-BD83-AE56FA0945EB}" type="datetimeFigureOut">
               <a:rPr lang="pt-BR" smtClean="0"/>
-              <a:t>20/11/2018</a:t>
+              <a:t>26/03/2019</a:t>
             </a:fld>
             <a:endParaRPr lang="pt-BR"/>
           </a:p>
@@ -3571,7 +3570,7 @@
     </p:spTree>
     <p:extLst>
       <p:ext uri="{BB962C8B-B14F-4D97-AF65-F5344CB8AC3E}">
-        <p14:creationId xmlns:p14="http://schemas.microsoft.com/office/powerpoint/2010/main" val="2009956151"/>
+        <p14:creationId xmlns:p14="http://schemas.microsoft.com/office/powerpoint/2010/main" val="251856701"/>
       </p:ext>
     </p:extLst>
   </p:cSld>
@@ -3655,7 +3654,7 @@
     </p:spTree>
     <p:extLst>
       <p:ext uri="{BB962C8B-B14F-4D97-AF65-F5344CB8AC3E}">
-        <p14:creationId xmlns:p14="http://schemas.microsoft.com/office/powerpoint/2010/main" val="251856701"/>
+        <p14:creationId xmlns:p14="http://schemas.microsoft.com/office/powerpoint/2010/main" val="2266571926"/>
       </p:ext>
     </p:extLst>
   </p:cSld>
@@ -3739,7 +3738,7 @@
     </p:spTree>
     <p:extLst>
       <p:ext uri="{BB962C8B-B14F-4D97-AF65-F5344CB8AC3E}">
-        <p14:creationId xmlns:p14="http://schemas.microsoft.com/office/powerpoint/2010/main" val="2266571926"/>
+        <p14:creationId xmlns:p14="http://schemas.microsoft.com/office/powerpoint/2010/main" val="207030799"/>
       </p:ext>
     </p:extLst>
   </p:cSld>
@@ -3823,7 +3822,7 @@
     </p:spTree>
     <p:extLst>
       <p:ext uri="{BB962C8B-B14F-4D97-AF65-F5344CB8AC3E}">
-        <p14:creationId xmlns:p14="http://schemas.microsoft.com/office/powerpoint/2010/main" val="207030799"/>
+        <p14:creationId xmlns:p14="http://schemas.microsoft.com/office/powerpoint/2010/main" val="1431313662"/>
       </p:ext>
     </p:extLst>
   </p:cSld>
@@ -3907,7 +3906,7 @@
     </p:spTree>
     <p:extLst>
       <p:ext uri="{BB962C8B-B14F-4D97-AF65-F5344CB8AC3E}">
-        <p14:creationId xmlns:p14="http://schemas.microsoft.com/office/powerpoint/2010/main" val="1431313662"/>
+        <p14:creationId xmlns:p14="http://schemas.microsoft.com/office/powerpoint/2010/main" val="257821181"/>
       </p:ext>
     </p:extLst>
   </p:cSld>
@@ -3991,7 +3990,7 @@
     </p:spTree>
     <p:extLst>
       <p:ext uri="{BB962C8B-B14F-4D97-AF65-F5344CB8AC3E}">
-        <p14:creationId xmlns:p14="http://schemas.microsoft.com/office/powerpoint/2010/main" val="257821181"/>
+        <p14:creationId xmlns:p14="http://schemas.microsoft.com/office/powerpoint/2010/main" val="1127979433"/>
       </p:ext>
     </p:extLst>
   </p:cSld>
@@ -4075,7 +4074,7 @@
     </p:spTree>
     <p:extLst>
       <p:ext uri="{BB962C8B-B14F-4D97-AF65-F5344CB8AC3E}">
-        <p14:creationId xmlns:p14="http://schemas.microsoft.com/office/powerpoint/2010/main" val="1127979433"/>
+        <p14:creationId xmlns:p14="http://schemas.microsoft.com/office/powerpoint/2010/main" val="2063177154"/>
       </p:ext>
     </p:extLst>
   </p:cSld>
@@ -4159,7 +4158,7 @@
     </p:spTree>
     <p:extLst>
       <p:ext uri="{BB962C8B-B14F-4D97-AF65-F5344CB8AC3E}">
-        <p14:creationId xmlns:p14="http://schemas.microsoft.com/office/powerpoint/2010/main" val="2063177154"/>
+        <p14:creationId xmlns:p14="http://schemas.microsoft.com/office/powerpoint/2010/main" val="2864432620"/>
       </p:ext>
     </p:extLst>
   </p:cSld>
@@ -4243,7 +4242,7 @@
     </p:spTree>
     <p:extLst>
       <p:ext uri="{BB962C8B-B14F-4D97-AF65-F5344CB8AC3E}">
-        <p14:creationId xmlns:p14="http://schemas.microsoft.com/office/powerpoint/2010/main" val="2864432620"/>
+        <p14:creationId xmlns:p14="http://schemas.microsoft.com/office/powerpoint/2010/main" val="3647160020"/>
       </p:ext>
     </p:extLst>
   </p:cSld>
@@ -4327,7 +4326,7 @@
     </p:spTree>
     <p:extLst>
       <p:ext uri="{BB962C8B-B14F-4D97-AF65-F5344CB8AC3E}">
-        <p14:creationId xmlns:p14="http://schemas.microsoft.com/office/powerpoint/2010/main" val="3647160020"/>
+        <p14:creationId xmlns:p14="http://schemas.microsoft.com/office/powerpoint/2010/main" val="197196661"/>
       </p:ext>
     </p:extLst>
   </p:cSld>
@@ -4495,90 +4494,6 @@
     </p:spTree>
     <p:extLst>
       <p:ext uri="{BB962C8B-B14F-4D97-AF65-F5344CB8AC3E}">
-        <p14:creationId xmlns:p14="http://schemas.microsoft.com/office/powerpoint/2010/main" val="197196661"/>
-      </p:ext>
-    </p:extLst>
-  </p:cSld>
-  <p:clrMapOvr>
-    <a:masterClrMapping/>
-  </p:clrMapOvr>
-</p:notes>
-</file>
-
-<file path=ppt/notesSlides/notesSlide21.xml><?xml version="1.0" encoding="utf-8"?>
-<p:notes xmlns:a="http://schemas.openxmlformats.org/drawingml/2006/main" xmlns:r="http://schemas.openxmlformats.org/officeDocument/2006/relationships" xmlns:p="http://schemas.openxmlformats.org/presentationml/2006/main">
-  <p:cSld>
-    <p:spTree>
-      <p:nvGrpSpPr>
-        <p:cNvPr id="1" name=""/>
-        <p:cNvGrpSpPr/>
-        <p:nvPr/>
-      </p:nvGrpSpPr>
-      <p:grpSpPr>
-        <a:xfrm>
-          <a:off x="0" y="0"/>
-          <a:ext cx="0" cy="0"/>
-          <a:chOff x="0" y="0"/>
-          <a:chExt cx="0" cy="0"/>
-        </a:xfrm>
-      </p:grpSpPr>
-      <p:sp>
-        <p:nvSpPr>
-          <p:cNvPr id="2" name="Slide Image Placeholder 1"/>
-          <p:cNvSpPr>
-            <a:spLocks noGrp="1" noRot="1" noChangeAspect="1"/>
-          </p:cNvSpPr>
-          <p:nvPr>
-            <p:ph type="sldImg"/>
-          </p:nvPr>
-        </p:nvSpPr>
-        <p:spPr/>
-      </p:sp>
-      <p:sp>
-        <p:nvSpPr>
-          <p:cNvPr id="3" name="Notes Placeholder 2"/>
-          <p:cNvSpPr>
-            <a:spLocks noGrp="1"/>
-          </p:cNvSpPr>
-          <p:nvPr>
-            <p:ph type="body" idx="1"/>
-          </p:nvPr>
-        </p:nvSpPr>
-        <p:spPr/>
-        <p:txBody>
-          <a:bodyPr/>
-          <a:lstStyle/>
-          <a:p>
-            <a:endParaRPr lang="en-US" dirty="0"/>
-          </a:p>
-        </p:txBody>
-      </p:sp>
-      <p:sp>
-        <p:nvSpPr>
-          <p:cNvPr id="4" name="Slide Number Placeholder 3"/>
-          <p:cNvSpPr>
-            <a:spLocks noGrp="1"/>
-          </p:cNvSpPr>
-          <p:nvPr>
-            <p:ph type="sldNum" sz="quarter" idx="5"/>
-          </p:nvPr>
-        </p:nvSpPr>
-        <p:spPr/>
-        <p:txBody>
-          <a:bodyPr/>
-          <a:lstStyle/>
-          <a:p>
-            <a:fld id="{020F486D-935E-4125-8FD7-C735663CC7DE}" type="slidenum">
-              <a:rPr lang="pt-BR" smtClean="0"/>
-              <a:t>21</a:t>
-            </a:fld>
-            <a:endParaRPr lang="pt-BR"/>
-          </a:p>
-        </p:txBody>
-      </p:sp>
-    </p:spTree>
-    <p:extLst>
-      <p:ext uri="{BB962C8B-B14F-4D97-AF65-F5344CB8AC3E}">
         <p14:creationId xmlns:p14="http://schemas.microsoft.com/office/powerpoint/2010/main" val="2411581045"/>
       </p:ext>
     </p:extLst>
@@ -5167,7 +5082,7 @@
     </p:spTree>
     <p:extLst>
       <p:ext uri="{BB962C8B-B14F-4D97-AF65-F5344CB8AC3E}">
-        <p14:creationId xmlns:p14="http://schemas.microsoft.com/office/powerpoint/2010/main" val="3062905491"/>
+        <p14:creationId xmlns:p14="http://schemas.microsoft.com/office/powerpoint/2010/main" val="2009956151"/>
       </p:ext>
     </p:extLst>
   </p:cSld>
@@ -5336,7 +5251,7 @@
           <a:p>
             <a:fld id="{9642BF85-54FF-46CE-B398-87F998CFD60B}" type="datetimeFigureOut">
               <a:rPr lang="pt-BR" smtClean="0"/>
-              <a:t>20/11/2018</a:t>
+              <a:t>26/03/2019</a:t>
             </a:fld>
             <a:endParaRPr lang="pt-BR"/>
           </a:p>
@@ -5504,7 +5419,7 @@
           <a:p>
             <a:fld id="{9642BF85-54FF-46CE-B398-87F998CFD60B}" type="datetimeFigureOut">
               <a:rPr lang="pt-BR" smtClean="0"/>
-              <a:t>20/11/2018</a:t>
+              <a:t>26/03/2019</a:t>
             </a:fld>
             <a:endParaRPr lang="pt-BR"/>
           </a:p>
@@ -5682,7 +5597,7 @@
           <a:p>
             <a:fld id="{9642BF85-54FF-46CE-B398-87F998CFD60B}" type="datetimeFigureOut">
               <a:rPr lang="pt-BR" smtClean="0"/>
-              <a:t>20/11/2018</a:t>
+              <a:t>26/03/2019</a:t>
             </a:fld>
             <a:endParaRPr lang="pt-BR"/>
           </a:p>
@@ -6019,7 +5934,7 @@
           <a:p>
             <a:fld id="{9642BF85-54FF-46CE-B398-87F998CFD60B}" type="datetimeFigureOut">
               <a:rPr lang="pt-BR" smtClean="0"/>
-              <a:t>20/11/2018</a:t>
+              <a:t>26/03/2019</a:t>
             </a:fld>
             <a:endParaRPr lang="pt-BR"/>
           </a:p>
@@ -6290,7 +6205,7 @@
           <a:p>
             <a:fld id="{9642BF85-54FF-46CE-B398-87F998CFD60B}" type="datetimeFigureOut">
               <a:rPr lang="pt-BR" smtClean="0"/>
-              <a:t>20/11/2018</a:t>
+              <a:t>26/03/2019</a:t>
             </a:fld>
             <a:endParaRPr lang="pt-BR"/>
           </a:p>
@@ -6536,7 +6451,7 @@
           <a:p>
             <a:fld id="{9642BF85-54FF-46CE-B398-87F998CFD60B}" type="datetimeFigureOut">
               <a:rPr lang="pt-BR" smtClean="0"/>
-              <a:t>20/11/2018</a:t>
+              <a:t>26/03/2019</a:t>
             </a:fld>
             <a:endParaRPr lang="pt-BR"/>
           </a:p>
@@ -6900,7 +6815,7 @@
           <a:p>
             <a:fld id="{9642BF85-54FF-46CE-B398-87F998CFD60B}" type="datetimeFigureOut">
               <a:rPr lang="pt-BR" smtClean="0"/>
-              <a:t>20/11/2018</a:t>
+              <a:t>26/03/2019</a:t>
             </a:fld>
             <a:endParaRPr lang="pt-BR"/>
           </a:p>
@@ -7034,7 +6949,7 @@
           <a:p>
             <a:fld id="{9642BF85-54FF-46CE-B398-87F998CFD60B}" type="datetimeFigureOut">
               <a:rPr lang="pt-BR" smtClean="0"/>
-              <a:t>20/11/2018</a:t>
+              <a:t>26/03/2019</a:t>
             </a:fld>
             <a:endParaRPr lang="pt-BR"/>
           </a:p>
@@ -7129,7 +7044,7 @@
           <a:p>
             <a:fld id="{9642BF85-54FF-46CE-B398-87F998CFD60B}" type="datetimeFigureOut">
               <a:rPr lang="pt-BR" smtClean="0"/>
-              <a:t>20/11/2018</a:t>
+              <a:t>26/03/2019</a:t>
             </a:fld>
             <a:endParaRPr lang="pt-BR"/>
           </a:p>
@@ -7404,7 +7319,7 @@
           <a:p>
             <a:fld id="{9642BF85-54FF-46CE-B398-87F998CFD60B}" type="datetimeFigureOut">
               <a:rPr lang="pt-BR" smtClean="0"/>
-              <a:t>20/11/2018</a:t>
+              <a:t>26/03/2019</a:t>
             </a:fld>
             <a:endParaRPr lang="pt-BR"/>
           </a:p>
@@ -7656,7 +7571,7 @@
           <a:p>
             <a:fld id="{9642BF85-54FF-46CE-B398-87F998CFD60B}" type="datetimeFigureOut">
               <a:rPr lang="pt-BR" smtClean="0"/>
-              <a:t>20/11/2018</a:t>
+              <a:t>26/03/2019</a:t>
             </a:fld>
             <a:endParaRPr lang="pt-BR"/>
           </a:p>
@@ -7876,7 +7791,7 @@
           <a:p>
             <a:fld id="{9642BF85-54FF-46CE-B398-87F998CFD60B}" type="datetimeFigureOut">
               <a:rPr lang="pt-BR" smtClean="0"/>
-              <a:t>20/11/2018</a:t>
+              <a:t>26/03/2019</a:t>
             </a:fld>
             <a:endParaRPr lang="pt-BR"/>
           </a:p>
@@ -8425,7 +8340,12 @@
             <p:ph idx="1"/>
           </p:nvPr>
         </p:nvSpPr>
-        <p:spPr/>
+        <p:spPr>
+          <a:xfrm>
+            <a:off x="317694" y="1291052"/>
+            <a:ext cx="11705493" cy="1158234"/>
+          </a:xfrm>
+        </p:spPr>
         <p:txBody>
           <a:bodyPr>
             <a:normAutofit/>
@@ -8434,7 +8354,242 @@
           <a:p>
             <a:r>
               <a:rPr lang="pt-BR" dirty="0"/>
-              <a:t>Detalham como o conceito será transformado em um jogo real. São tomadas decisões sobre os principais objetivos do projeto, o conjunto básico de recursos, os produtos das etapas, a tecnologia básica e o pipeline de produção.</a:t>
+              <a:t>A etapa de levantamento dos requisitos do jogo pode ser dividida em 9 fases:</a:t>
+            </a:r>
+          </a:p>
+        </p:txBody>
+      </p:sp>
+      <p:sp>
+        <p:nvSpPr>
+          <p:cNvPr id="2" name="CaixaDeTexto 1"/>
+          <p:cNvSpPr txBox="1"/>
+          <p:nvPr/>
+        </p:nvSpPr>
+        <p:spPr>
+          <a:xfrm>
+            <a:off x="288757" y="2269109"/>
+            <a:ext cx="5654843" cy="3890489"/>
+          </a:xfrm>
+          <a:prstGeom prst="rect">
+            <a:avLst/>
+          </a:prstGeom>
+          <a:noFill/>
+        </p:spPr>
+        <p:txBody>
+          <a:bodyPr wrap="square" rtlCol="0">
+            <a:spAutoFit/>
+          </a:bodyPr>
+          <a:lstStyle/>
+          <a:p>
+            <a:pPr marL="457200" indent="-457200">
+              <a:lnSpc>
+                <a:spcPct val="150000"/>
+              </a:lnSpc>
+              <a:buFont typeface="+mj-lt"/>
+              <a:buAutoNum type="arabicPeriod"/>
+            </a:pPr>
+            <a:r>
+              <a:rPr lang="pt-BR" sz="2800" dirty="0">
+                <a:solidFill>
+                  <a:schemeClr val="accent1">
+                    <a:lumMod val="50000"/>
+                  </a:schemeClr>
+                </a:solidFill>
+                <a:latin typeface="Helvetica" panose="020B0604020202020204" pitchFamily="34" charset="0"/>
+                <a:cs typeface="Helvetica" panose="020B0604020202020204" pitchFamily="34" charset="0"/>
+              </a:rPr>
+              <a:t>Definição dos recursos do jogo;</a:t>
+            </a:r>
+          </a:p>
+          <a:p>
+            <a:pPr marL="457200" indent="-457200">
+              <a:lnSpc>
+                <a:spcPct val="150000"/>
+              </a:lnSpc>
+              <a:buFont typeface="+mj-lt"/>
+              <a:buAutoNum type="arabicPeriod"/>
+            </a:pPr>
+            <a:r>
+              <a:rPr lang="pt-BR" sz="2800" dirty="0">
+                <a:solidFill>
+                  <a:schemeClr val="accent1">
+                    <a:lumMod val="50000"/>
+                  </a:schemeClr>
+                </a:solidFill>
+                <a:latin typeface="Helvetica" panose="020B0604020202020204" pitchFamily="34" charset="0"/>
+                <a:cs typeface="Helvetica" panose="020B0604020202020204" pitchFamily="34" charset="0"/>
+              </a:rPr>
+              <a:t>Definição das etapas e produtos;</a:t>
+            </a:r>
+          </a:p>
+          <a:p>
+            <a:pPr marL="457200" indent="-457200">
+              <a:lnSpc>
+                <a:spcPct val="150000"/>
+              </a:lnSpc>
+              <a:buFont typeface="+mj-lt"/>
+              <a:buAutoNum type="arabicPeriod"/>
+            </a:pPr>
+            <a:r>
+              <a:rPr lang="pt-BR" sz="2800" dirty="0">
+                <a:solidFill>
+                  <a:schemeClr val="accent1">
+                    <a:lumMod val="50000"/>
+                  </a:schemeClr>
+                </a:solidFill>
+                <a:latin typeface="Helvetica" panose="020B0604020202020204" pitchFamily="34" charset="0"/>
+                <a:cs typeface="Helvetica" panose="020B0604020202020204" pitchFamily="34" charset="0"/>
+              </a:rPr>
+              <a:t>Avaliação da tecnologia;</a:t>
+            </a:r>
+          </a:p>
+          <a:p>
+            <a:pPr marL="457200" indent="-457200">
+              <a:lnSpc>
+                <a:spcPct val="150000"/>
+              </a:lnSpc>
+              <a:buFont typeface="+mj-lt"/>
+              <a:buAutoNum type="arabicPeriod"/>
+            </a:pPr>
+            <a:r>
+              <a:rPr lang="pt-BR" sz="2800" dirty="0">
+                <a:solidFill>
+                  <a:schemeClr val="accent1">
+                    <a:lumMod val="50000"/>
+                  </a:schemeClr>
+                </a:solidFill>
+                <a:latin typeface="Helvetica" panose="020B0604020202020204" pitchFamily="34" charset="0"/>
+                <a:cs typeface="Helvetica" panose="020B0604020202020204" pitchFamily="34" charset="0"/>
+              </a:rPr>
+              <a:t>Definição das ferramentas e do pipeline;</a:t>
+            </a:r>
+          </a:p>
+        </p:txBody>
+      </p:sp>
+      <p:sp>
+        <p:nvSpPr>
+          <p:cNvPr id="7" name="CaixaDeTexto 6"/>
+          <p:cNvSpPr txBox="1"/>
+          <p:nvPr/>
+        </p:nvSpPr>
+        <p:spPr>
+          <a:xfrm>
+            <a:off x="6841671" y="2269109"/>
+            <a:ext cx="5181516" cy="3244158"/>
+          </a:xfrm>
+          <a:prstGeom prst="rect">
+            <a:avLst/>
+          </a:prstGeom>
+          <a:noFill/>
+        </p:spPr>
+        <p:txBody>
+          <a:bodyPr wrap="square" rtlCol="0">
+            <a:spAutoFit/>
+          </a:bodyPr>
+          <a:lstStyle/>
+          <a:p>
+            <a:pPr marL="457200" indent="-457200">
+              <a:lnSpc>
+                <a:spcPct val="150000"/>
+              </a:lnSpc>
+              <a:buFont typeface="+mj-lt"/>
+              <a:buAutoNum type="arabicPeriod" startAt="5"/>
+            </a:pPr>
+            <a:r>
+              <a:rPr lang="pt-BR" sz="2800" dirty="0">
+                <a:solidFill>
+                  <a:schemeClr val="accent1">
+                    <a:lumMod val="50000"/>
+                  </a:schemeClr>
+                </a:solidFill>
+                <a:latin typeface="Helvetica" panose="020B0604020202020204" pitchFamily="34" charset="0"/>
+                <a:cs typeface="Helvetica" panose="020B0604020202020204" pitchFamily="34" charset="0"/>
+              </a:rPr>
+              <a:t>Documentação do design;</a:t>
+            </a:r>
+          </a:p>
+          <a:p>
+            <a:pPr marL="457200" indent="-457200">
+              <a:lnSpc>
+                <a:spcPct val="150000"/>
+              </a:lnSpc>
+              <a:buFont typeface="+mj-lt"/>
+              <a:buAutoNum type="arabicPeriod" startAt="5"/>
+            </a:pPr>
+            <a:r>
+              <a:rPr lang="pt-BR" sz="2800" dirty="0">
+                <a:solidFill>
+                  <a:schemeClr val="accent1">
+                    <a:lumMod val="50000"/>
+                  </a:schemeClr>
+                </a:solidFill>
+                <a:latin typeface="Helvetica" panose="020B0604020202020204" pitchFamily="34" charset="0"/>
+                <a:cs typeface="Helvetica" panose="020B0604020202020204" pitchFamily="34" charset="0"/>
+              </a:rPr>
+              <a:t>Documentação da arte;</a:t>
+            </a:r>
+          </a:p>
+          <a:p>
+            <a:pPr marL="457200" indent="-457200">
+              <a:lnSpc>
+                <a:spcPct val="150000"/>
+              </a:lnSpc>
+              <a:buFont typeface="+mj-lt"/>
+              <a:buAutoNum type="arabicPeriod" startAt="5"/>
+            </a:pPr>
+            <a:r>
+              <a:rPr lang="pt-BR" sz="2800" dirty="0">
+                <a:solidFill>
+                  <a:schemeClr val="accent1">
+                    <a:lumMod val="50000"/>
+                  </a:schemeClr>
+                </a:solidFill>
+                <a:latin typeface="Helvetica" panose="020B0604020202020204" pitchFamily="34" charset="0"/>
+                <a:cs typeface="Helvetica" panose="020B0604020202020204" pitchFamily="34" charset="0"/>
+              </a:rPr>
+              <a:t>Documentação técnica;</a:t>
+            </a:r>
+          </a:p>
+          <a:p>
+            <a:pPr marL="457200" indent="-457200">
+              <a:lnSpc>
+                <a:spcPct val="150000"/>
+              </a:lnSpc>
+              <a:buFont typeface="+mj-lt"/>
+              <a:buAutoNum type="arabicPeriod" startAt="5"/>
+            </a:pPr>
+            <a:r>
+              <a:rPr lang="pt-BR" sz="2800" dirty="0">
+                <a:solidFill>
+                  <a:schemeClr val="accent1">
+                    <a:lumMod val="50000"/>
+                  </a:schemeClr>
+                </a:solidFill>
+                <a:latin typeface="Helvetica" panose="020B0604020202020204" pitchFamily="34" charset="0"/>
+                <a:cs typeface="Helvetica" panose="020B0604020202020204" pitchFamily="34" charset="0"/>
+              </a:rPr>
+              <a:t>Análise de risco;</a:t>
+            </a:r>
+          </a:p>
+          <a:p>
+            <a:pPr marL="457200" indent="-457200">
+              <a:lnSpc>
+                <a:spcPct val="150000"/>
+              </a:lnSpc>
+              <a:buFont typeface="+mj-lt"/>
+              <a:buAutoNum type="arabicPeriod" startAt="5"/>
+            </a:pPr>
+            <a:r>
+              <a:rPr lang="pt-BR" sz="2800" dirty="0">
+                <a:solidFill>
+                  <a:schemeClr val="accent1">
+                    <a:lumMod val="50000"/>
+                  </a:schemeClr>
+                </a:solidFill>
+                <a:latin typeface="Helvetica" panose="020B0604020202020204" pitchFamily="34" charset="0"/>
+                <a:cs typeface="Helvetica" panose="020B0604020202020204" pitchFamily="34" charset="0"/>
+              </a:rPr>
+              <a:t>Aprovação.</a:t>
             </a:r>
           </a:p>
         </p:txBody>
@@ -8442,7 +8597,7 @@
     </p:spTree>
     <p:extLst>
       <p:ext uri="{BB962C8B-B14F-4D97-AF65-F5344CB8AC3E}">
-        <p14:creationId xmlns:p14="http://schemas.microsoft.com/office/powerpoint/2010/main" val="1256872412"/>
+        <p14:creationId xmlns:p14="http://schemas.microsoft.com/office/powerpoint/2010/main" val="3655771392"/>
       </p:ext>
     </p:extLst>
   </p:cSld>
@@ -8493,7 +8648,7 @@
           <a:p>
             <a:r>
               <a:rPr lang="pt-BR" dirty="0"/>
-              <a:t>Requisitos do Jogo</a:t>
+              <a:t>Definição dos Recursos</a:t>
             </a:r>
           </a:p>
         </p:txBody>
@@ -8508,12 +8663,7 @@
             <p:ph idx="1"/>
           </p:nvPr>
         </p:nvSpPr>
-        <p:spPr>
-          <a:xfrm>
-            <a:off x="317694" y="1291052"/>
-            <a:ext cx="11705493" cy="1158234"/>
-          </a:xfrm>
-        </p:spPr>
+        <p:spPr/>
         <p:txBody>
           <a:bodyPr>
             <a:normAutofit/>
@@ -8522,242 +8672,49 @@
           <a:p>
             <a:r>
               <a:rPr lang="pt-BR" dirty="0"/>
-              <a:t>A etapa de levantamento dos requisitos do jogo pode ser dividida em 9 fases:</a:t>
-            </a:r>
-          </a:p>
-        </p:txBody>
-      </p:sp>
-      <p:sp>
-        <p:nvSpPr>
-          <p:cNvPr id="2" name="CaixaDeTexto 1"/>
-          <p:cNvSpPr txBox="1"/>
-          <p:nvPr/>
-        </p:nvSpPr>
-        <p:spPr>
-          <a:xfrm>
-            <a:off x="288757" y="2269109"/>
-            <a:ext cx="5654843" cy="3890489"/>
-          </a:xfrm>
-          <a:prstGeom prst="rect">
-            <a:avLst/>
-          </a:prstGeom>
-          <a:noFill/>
-        </p:spPr>
-        <p:txBody>
-          <a:bodyPr wrap="square" rtlCol="0">
-            <a:spAutoFit/>
-          </a:bodyPr>
-          <a:lstStyle/>
-          <a:p>
-            <a:pPr marL="457200" indent="-457200">
-              <a:lnSpc>
-                <a:spcPct val="150000"/>
-              </a:lnSpc>
-              <a:buFont typeface="+mj-lt"/>
-              <a:buAutoNum type="arabicPeriod"/>
+              <a:t>O recursos devem ser priorizados em diferentes camadas de implementação. Por exemplo:</a:t>
+            </a:r>
+          </a:p>
+          <a:p>
+            <a:pPr marL="457200" indent="-457200" algn="l">
+              <a:buFont typeface="Arial" panose="020B0604020202020204" pitchFamily="34" charset="0"/>
+              <a:buChar char="•"/>
             </a:pPr>
             <a:r>
-              <a:rPr lang="pt-BR" sz="2800" dirty="0">
-                <a:solidFill>
-                  <a:schemeClr val="accent1">
-                    <a:lumMod val="50000"/>
-                  </a:schemeClr>
-                </a:solidFill>
-                <a:latin typeface="Helvetica" panose="020B0604020202020204" pitchFamily="34" charset="0"/>
-                <a:cs typeface="Helvetica" panose="020B0604020202020204" pitchFamily="34" charset="0"/>
-              </a:rPr>
-              <a:t>Definição dos recursos do jogo;</a:t>
-            </a:r>
-          </a:p>
-          <a:p>
-            <a:pPr marL="457200" indent="-457200">
-              <a:lnSpc>
-                <a:spcPct val="150000"/>
-              </a:lnSpc>
-              <a:buFont typeface="+mj-lt"/>
-              <a:buAutoNum type="arabicPeriod"/>
+              <a:rPr lang="pt-BR" b="1" dirty="0"/>
+              <a:t>Camada 1</a:t>
+            </a:r>
+            <a:r>
+              <a:rPr lang="pt-BR" dirty="0"/>
+              <a:t>: recursos básicos do jogo;</a:t>
+            </a:r>
+          </a:p>
+          <a:p>
+            <a:pPr marL="457200" indent="-457200" algn="l">
+              <a:buFont typeface="Arial" panose="020B0604020202020204" pitchFamily="34" charset="0"/>
+              <a:buChar char="•"/>
             </a:pPr>
             <a:r>
-              <a:rPr lang="pt-BR" sz="2800" dirty="0">
-                <a:solidFill>
-                  <a:schemeClr val="accent1">
-                    <a:lumMod val="50000"/>
-                  </a:schemeClr>
-                </a:solidFill>
-                <a:latin typeface="Helvetica" panose="020B0604020202020204" pitchFamily="34" charset="0"/>
-                <a:cs typeface="Helvetica" panose="020B0604020202020204" pitchFamily="34" charset="0"/>
-              </a:rPr>
-              <a:t>Definição das etapas e produtos;</a:t>
-            </a:r>
-          </a:p>
-          <a:p>
-            <a:pPr marL="457200" indent="-457200">
-              <a:lnSpc>
-                <a:spcPct val="150000"/>
-              </a:lnSpc>
-              <a:buFont typeface="+mj-lt"/>
-              <a:buAutoNum type="arabicPeriod"/>
+              <a:rPr lang="pt-BR" b="1" dirty="0"/>
+              <a:t>Camada 2</a:t>
+            </a:r>
+            <a:r>
+              <a:rPr lang="pt-BR" dirty="0"/>
+              <a:t>: adicionam valor aos recursos básicos; e</a:t>
+            </a:r>
+          </a:p>
+          <a:p>
+            <a:pPr marL="457200" indent="-457200" algn="l">
+              <a:buFont typeface="Arial" panose="020B0604020202020204" pitchFamily="34" charset="0"/>
+              <a:buChar char="•"/>
             </a:pPr>
             <a:r>
-              <a:rPr lang="pt-BR" sz="2800" dirty="0">
-                <a:solidFill>
-                  <a:schemeClr val="accent1">
-                    <a:lumMod val="50000"/>
-                  </a:schemeClr>
-                </a:solidFill>
-                <a:latin typeface="Helvetica" panose="020B0604020202020204" pitchFamily="34" charset="0"/>
-                <a:cs typeface="Helvetica" panose="020B0604020202020204" pitchFamily="34" charset="0"/>
-              </a:rPr>
-              <a:t>Avaliação da tecnologia;</a:t>
-            </a:r>
-          </a:p>
-          <a:p>
-            <a:pPr marL="457200" indent="-457200">
-              <a:lnSpc>
-                <a:spcPct val="150000"/>
-              </a:lnSpc>
-              <a:buFont typeface="+mj-lt"/>
-              <a:buAutoNum type="arabicPeriod"/>
-            </a:pPr>
-            <a:r>
-              <a:rPr lang="pt-BR" sz="2800" dirty="0">
-                <a:solidFill>
-                  <a:schemeClr val="accent1">
-                    <a:lumMod val="50000"/>
-                  </a:schemeClr>
-                </a:solidFill>
-                <a:latin typeface="Helvetica" panose="020B0604020202020204" pitchFamily="34" charset="0"/>
-                <a:cs typeface="Helvetica" panose="020B0604020202020204" pitchFamily="34" charset="0"/>
-              </a:rPr>
-              <a:t>Definição das ferramentas e do pipeline;</a:t>
-            </a:r>
-          </a:p>
-        </p:txBody>
-      </p:sp>
-      <p:sp>
-        <p:nvSpPr>
-          <p:cNvPr id="7" name="CaixaDeTexto 6"/>
-          <p:cNvSpPr txBox="1"/>
-          <p:nvPr/>
-        </p:nvSpPr>
-        <p:spPr>
-          <a:xfrm>
-            <a:off x="6841671" y="2269109"/>
-            <a:ext cx="5181516" cy="3244158"/>
-          </a:xfrm>
-          <a:prstGeom prst="rect">
-            <a:avLst/>
-          </a:prstGeom>
-          <a:noFill/>
-        </p:spPr>
-        <p:txBody>
-          <a:bodyPr wrap="square" rtlCol="0">
-            <a:spAutoFit/>
-          </a:bodyPr>
-          <a:lstStyle/>
-          <a:p>
-            <a:pPr marL="457200" indent="-457200">
-              <a:lnSpc>
-                <a:spcPct val="150000"/>
-              </a:lnSpc>
-              <a:buFont typeface="+mj-lt"/>
-              <a:buAutoNum type="arabicPeriod" startAt="5"/>
-            </a:pPr>
-            <a:r>
-              <a:rPr lang="pt-BR" sz="2800" dirty="0">
-                <a:solidFill>
-                  <a:schemeClr val="accent1">
-                    <a:lumMod val="50000"/>
-                  </a:schemeClr>
-                </a:solidFill>
-                <a:latin typeface="Helvetica" panose="020B0604020202020204" pitchFamily="34" charset="0"/>
-                <a:cs typeface="Helvetica" panose="020B0604020202020204" pitchFamily="34" charset="0"/>
-              </a:rPr>
-              <a:t>Documentação do design;</a:t>
-            </a:r>
-          </a:p>
-          <a:p>
-            <a:pPr marL="457200" indent="-457200">
-              <a:lnSpc>
-                <a:spcPct val="150000"/>
-              </a:lnSpc>
-              <a:buFont typeface="+mj-lt"/>
-              <a:buAutoNum type="arabicPeriod" startAt="5"/>
-            </a:pPr>
-            <a:r>
-              <a:rPr lang="pt-BR" sz="2800" dirty="0">
-                <a:solidFill>
-                  <a:schemeClr val="accent1">
-                    <a:lumMod val="50000"/>
-                  </a:schemeClr>
-                </a:solidFill>
-                <a:latin typeface="Helvetica" panose="020B0604020202020204" pitchFamily="34" charset="0"/>
-                <a:cs typeface="Helvetica" panose="020B0604020202020204" pitchFamily="34" charset="0"/>
-              </a:rPr>
-              <a:t>Documentação da arte;</a:t>
-            </a:r>
-          </a:p>
-          <a:p>
-            <a:pPr marL="457200" indent="-457200">
-              <a:lnSpc>
-                <a:spcPct val="150000"/>
-              </a:lnSpc>
-              <a:buFont typeface="+mj-lt"/>
-              <a:buAutoNum type="arabicPeriod" startAt="5"/>
-            </a:pPr>
-            <a:r>
-              <a:rPr lang="pt-BR" sz="2800" dirty="0">
-                <a:solidFill>
-                  <a:schemeClr val="accent1">
-                    <a:lumMod val="50000"/>
-                  </a:schemeClr>
-                </a:solidFill>
-                <a:latin typeface="Helvetica" panose="020B0604020202020204" pitchFamily="34" charset="0"/>
-                <a:cs typeface="Helvetica" panose="020B0604020202020204" pitchFamily="34" charset="0"/>
-              </a:rPr>
-              <a:t>Documentação técnica;</a:t>
-            </a:r>
-          </a:p>
-          <a:p>
-            <a:pPr marL="457200" indent="-457200">
-              <a:lnSpc>
-                <a:spcPct val="150000"/>
-              </a:lnSpc>
-              <a:buFont typeface="+mj-lt"/>
-              <a:buAutoNum type="arabicPeriod" startAt="5"/>
-            </a:pPr>
-            <a:r>
-              <a:rPr lang="pt-BR" sz="2800" dirty="0">
-                <a:solidFill>
-                  <a:schemeClr val="accent1">
-                    <a:lumMod val="50000"/>
-                  </a:schemeClr>
-                </a:solidFill>
-                <a:latin typeface="Helvetica" panose="020B0604020202020204" pitchFamily="34" charset="0"/>
-                <a:cs typeface="Helvetica" panose="020B0604020202020204" pitchFamily="34" charset="0"/>
-              </a:rPr>
-              <a:t>Análise de risco;</a:t>
-            </a:r>
-          </a:p>
-          <a:p>
-            <a:pPr marL="457200" indent="-457200">
-              <a:lnSpc>
-                <a:spcPct val="150000"/>
-              </a:lnSpc>
-              <a:buFont typeface="+mj-lt"/>
-              <a:buAutoNum type="arabicPeriod" startAt="5"/>
-            </a:pPr>
-            <a:r>
-              <a:rPr lang="pt-BR" sz="2800" dirty="0">
-                <a:solidFill>
-                  <a:schemeClr val="accent1">
-                    <a:lumMod val="50000"/>
-                  </a:schemeClr>
-                </a:solidFill>
-                <a:latin typeface="Helvetica" panose="020B0604020202020204" pitchFamily="34" charset="0"/>
-                <a:cs typeface="Helvetica" panose="020B0604020202020204" pitchFamily="34" charset="0"/>
-              </a:rPr>
-              <a:t>Aprovação.</a:t>
+              <a:rPr lang="pt-BR" b="1" dirty="0"/>
+              <a:t>Camada 3</a:t>
+            </a:r>
+            <a:r>
+              <a:rPr lang="pt-BR" dirty="0"/>
+              <a:t>: designa recursos que seria interessante incluir.</a:t>
             </a:r>
           </a:p>
         </p:txBody>
@@ -8765,7 +8722,7 @@
     </p:spTree>
     <p:extLst>
       <p:ext uri="{BB962C8B-B14F-4D97-AF65-F5344CB8AC3E}">
-        <p14:creationId xmlns:p14="http://schemas.microsoft.com/office/powerpoint/2010/main" val="3655771392"/>
+        <p14:creationId xmlns:p14="http://schemas.microsoft.com/office/powerpoint/2010/main" val="1390759088"/>
       </p:ext>
     </p:extLst>
   </p:cSld>
@@ -8831,7 +8788,12 @@
             <p:ph idx="1"/>
           </p:nvPr>
         </p:nvSpPr>
-        <p:spPr/>
+        <p:spPr>
+          <a:xfrm>
+            <a:off x="317694" y="1291052"/>
+            <a:ext cx="11705493" cy="4930133"/>
+          </a:xfrm>
+        </p:spPr>
         <p:txBody>
           <a:bodyPr>
             <a:normAutofit/>
@@ -8840,7 +8802,7 @@
           <a:p>
             <a:r>
               <a:rPr lang="pt-BR" dirty="0"/>
-              <a:t>O recursos devem ser priorizados em diferentes camadas de implementação. Por exemplo:</a:t>
+              <a:t>Realize sessões de brainstorm para decidir que recursos devem ser incluídos no jogo e categorize-os por tipo:</a:t>
             </a:r>
           </a:p>
           <a:p>
@@ -8850,11 +8812,11 @@
             </a:pPr>
             <a:r>
               <a:rPr lang="pt-BR" b="1" dirty="0"/>
-              <a:t>Camada 1</a:t>
+              <a:t>Processo</a:t>
             </a:r>
             <a:r>
               <a:rPr lang="pt-BR" dirty="0"/>
-              <a:t>: recursos básicos do jogo;</a:t>
+              <a:t>: recursos ligados a melhoria do processo;</a:t>
             </a:r>
           </a:p>
           <a:p>
@@ -8864,11 +8826,11 @@
             </a:pPr>
             <a:r>
               <a:rPr lang="pt-BR" b="1" dirty="0"/>
-              <a:t>Camada 2</a:t>
+              <a:t>Produção</a:t>
             </a:r>
             <a:r>
               <a:rPr lang="pt-BR" dirty="0"/>
-              <a:t>: adicionam valor aos recursos básicos; e</a:t>
+              <a:t>: recursos que envolvem melhorias nas ferramentas e na tecnologia usadas na criação do jogo; e</a:t>
             </a:r>
           </a:p>
           <a:p>
@@ -8878,11 +8840,11 @@
             </a:pPr>
             <a:r>
               <a:rPr lang="pt-BR" b="1" dirty="0"/>
-              <a:t>Camada 3</a:t>
+              <a:t>Jogabilidade</a:t>
             </a:r>
             <a:r>
               <a:rPr lang="pt-BR" dirty="0"/>
-              <a:t>: designa recursos que seria interessante incluir.</a:t>
+              <a:t>: recursos compostos por elementos de jogabilidade que afetarão diretamente a experiência do jogador e que podem ser vistos por ele.</a:t>
             </a:r>
           </a:p>
         </p:txBody>
@@ -8890,7 +8852,7 @@
     </p:spTree>
     <p:extLst>
       <p:ext uri="{BB962C8B-B14F-4D97-AF65-F5344CB8AC3E}">
-        <p14:creationId xmlns:p14="http://schemas.microsoft.com/office/powerpoint/2010/main" val="1390759088"/>
+        <p14:creationId xmlns:p14="http://schemas.microsoft.com/office/powerpoint/2010/main" val="1792560046"/>
       </p:ext>
     </p:extLst>
   </p:cSld>
@@ -8941,7 +8903,7 @@
           <a:p>
             <a:r>
               <a:rPr lang="pt-BR" dirty="0"/>
-              <a:t>Definição dos Recursos</a:t>
+              <a:t>Definição das Etapas e Produtos</a:t>
             </a:r>
           </a:p>
         </p:txBody>
@@ -8970,49 +8932,13 @@
           <a:p>
             <a:r>
               <a:rPr lang="pt-BR" dirty="0"/>
-              <a:t>Realize sessões de brainstorm para decidir que recursos devem ser incluídos no jogo e categorize-os por tipo:</a:t>
-            </a:r>
-          </a:p>
-          <a:p>
-            <a:pPr marL="457200" indent="-457200" algn="l">
-              <a:buFont typeface="Arial" panose="020B0604020202020204" pitchFamily="34" charset="0"/>
-              <a:buChar char="•"/>
-            </a:pPr>
-            <a:r>
-              <a:rPr lang="pt-BR" b="1" dirty="0"/>
-              <a:t>Processo</a:t>
-            </a:r>
+              <a:t>As etapas marcam um evento importante durante o desenvolvimento do jogo e são usadas no rastreamento do progresso do projeto.</a:t>
+            </a:r>
+          </a:p>
+          <a:p>
             <a:r>
               <a:rPr lang="pt-BR" dirty="0"/>
-              <a:t>: recursos ligados a melhoria do processo;</a:t>
-            </a:r>
-          </a:p>
-          <a:p>
-            <a:pPr marL="457200" indent="-457200" algn="l">
-              <a:buFont typeface="Arial" panose="020B0604020202020204" pitchFamily="34" charset="0"/>
-              <a:buChar char="•"/>
-            </a:pPr>
-            <a:r>
-              <a:rPr lang="pt-BR" b="1" dirty="0"/>
-              <a:t>Produção</a:t>
-            </a:r>
-            <a:r>
-              <a:rPr lang="pt-BR" dirty="0"/>
-              <a:t>: recursos que envolvem melhorias nas ferramentas e na tecnologia usadas na criação do jogo; e</a:t>
-            </a:r>
-          </a:p>
-          <a:p>
-            <a:pPr marL="457200" indent="-457200" algn="l">
-              <a:buFont typeface="Arial" panose="020B0604020202020204" pitchFamily="34" charset="0"/>
-              <a:buChar char="•"/>
-            </a:pPr>
-            <a:r>
-              <a:rPr lang="pt-BR" b="1" dirty="0"/>
-              <a:t>Jogabilidade</a:t>
-            </a:r>
-            <a:r>
-              <a:rPr lang="pt-BR" dirty="0"/>
-              <a:t>: recursos compostos por elementos de jogabilidade que afetarão diretamente a experiência do jogador e que podem ser vistos por ele.</a:t>
+              <a:t>Elas dão objetivos menores e mais gerenciáveis para a equipe alcançar e podem ser facilmente definidas pela listagem dos produtos que são esperados em cada etapa</a:t>
             </a:r>
           </a:p>
         </p:txBody>
@@ -9020,7 +8946,7 @@
     </p:spTree>
     <p:extLst>
       <p:ext uri="{BB962C8B-B14F-4D97-AF65-F5344CB8AC3E}">
-        <p14:creationId xmlns:p14="http://schemas.microsoft.com/office/powerpoint/2010/main" val="1792560046"/>
+        <p14:creationId xmlns:p14="http://schemas.microsoft.com/office/powerpoint/2010/main" val="2526413613"/>
       </p:ext>
     </p:extLst>
   </p:cSld>
@@ -9071,8 +8997,13 @@
           <a:p>
             <a:r>
               <a:rPr lang="pt-BR" dirty="0"/>
-              <a:t>Definição das Etapas e Produtos</a:t>
-            </a:r>
+              <a:t>Definição das </a:t>
+            </a:r>
+            <a:r>
+              <a:rPr lang="pt-BR" dirty="0" smtClean="0"/>
+              <a:t>Etapas</a:t>
+            </a:r>
+            <a:endParaRPr lang="pt-BR" dirty="0"/>
           </a:p>
         </p:txBody>
       </p:sp>
@@ -9100,13 +9031,51 @@
           <a:p>
             <a:r>
               <a:rPr lang="pt-BR" dirty="0"/>
-              <a:t>As etapas marcam um evento importante durante o desenvolvimento do jogo e são usadas no rastreamento do progresso do projeto.</a:t>
-            </a:r>
-          </a:p>
-          <a:p>
+              <a:t>As etapas podem ser mensais ou maiores que podem duram alguns meses:</a:t>
+            </a:r>
+          </a:p>
+          <a:p>
+            <a:pPr marL="457200" indent="-457200" algn="l">
+              <a:buFont typeface="Arial" panose="020B0604020202020204" pitchFamily="34" charset="0"/>
+              <a:buChar char="•"/>
+            </a:pPr>
+            <a:r>
+              <a:rPr lang="pt-BR" b="1" dirty="0"/>
+              <a:t>Primeira versão jogável</a:t>
+            </a:r>
             <a:r>
               <a:rPr lang="pt-BR" dirty="0"/>
-              <a:t>Elas dão objetivos menores e mais gerenciáveis para a equipe alcançar e podem ser facilmente definidas pela listagem dos produtos que são esperados em cada etapa</a:t>
+              <a:t>: jogabilidade e </a:t>
+            </a:r>
+            <a:r>
+              <a:rPr lang="pt-BR" i="1" dirty="0" err="1"/>
+              <a:t>assets</a:t>
+            </a:r>
+            <a:r>
+              <a:rPr lang="pt-BR" dirty="0"/>
+              <a:t> representativos. Geralmente baseada no protótipo;</a:t>
+            </a:r>
+          </a:p>
+          <a:p>
+            <a:pPr marL="457200" indent="-457200" algn="l">
+              <a:buFont typeface="Arial" panose="020B0604020202020204" pitchFamily="34" charset="0"/>
+              <a:buChar char="•"/>
+            </a:pPr>
+            <a:r>
+              <a:rPr lang="pt-BR" b="1" dirty="0"/>
+              <a:t>Alfa</a:t>
+            </a:r>
+            <a:r>
+              <a:rPr lang="pt-BR" dirty="0"/>
+              <a:t>: funcionalidade chave da jogabilidade é implementada, os </a:t>
+            </a:r>
+            <a:r>
+              <a:rPr lang="pt-BR" dirty="0" err="1"/>
+              <a:t>assets</a:t>
+            </a:r>
+            <a:r>
+              <a:rPr lang="pt-BR" dirty="0"/>
+              <a:t> estão 40-50% concluídos, o jogo está sendo executado na plataforma de hardware correta;</a:t>
             </a:r>
           </a:p>
         </p:txBody>
@@ -9114,20 +9083,13 @@
     </p:spTree>
     <p:extLst>
       <p:ext uri="{BB962C8B-B14F-4D97-AF65-F5344CB8AC3E}">
-        <p14:creationId xmlns:p14="http://schemas.microsoft.com/office/powerpoint/2010/main" val="2526413613"/>
+        <p14:creationId xmlns:p14="http://schemas.microsoft.com/office/powerpoint/2010/main" val="2001992897"/>
       </p:ext>
     </p:extLst>
   </p:cSld>
   <p:clrMapOvr>
     <a:masterClrMapping/>
   </p:clrMapOvr>
-  <p:timing>
-    <p:tnLst>
-      <p:par>
-        <p:cTn id="1" dur="indefinite" restart="never" nodeType="tmRoot"/>
-      </p:par>
-    </p:tnLst>
-  </p:timing>
 </p:sld>
 </file>
 
@@ -9197,31 +9159,17 @@
           </a:bodyPr>
           <a:lstStyle/>
           <a:p>
-            <a:r>
-              <a:rPr lang="pt-BR" dirty="0"/>
-              <a:t>As etapas podem ser mensais ou maiores que podem duram alguns meses:</a:t>
-            </a:r>
-          </a:p>
-          <a:p>
             <a:pPr marL="457200" indent="-457200" algn="l">
               <a:buFont typeface="Arial" panose="020B0604020202020204" pitchFamily="34" charset="0"/>
               <a:buChar char="•"/>
             </a:pPr>
             <a:r>
               <a:rPr lang="pt-BR" b="1" dirty="0"/>
-              <a:t>Primeira versão jogável</a:t>
+              <a:t>Congelamento de código</a:t>
             </a:r>
             <a:r>
               <a:rPr lang="pt-BR" dirty="0"/>
-              <a:t>: jogabilidade e </a:t>
-            </a:r>
-            <a:r>
-              <a:rPr lang="pt-BR" i="1" dirty="0" err="1"/>
-              <a:t>assets</a:t>
-            </a:r>
-            <a:r>
-              <a:rPr lang="pt-BR" dirty="0"/>
-              <a:t> representativos. Geralmente baseada no protótipo;</a:t>
+              <a:t>: código do jogo concluído e os programadores apenas corrigirão bugs;</a:t>
             </a:r>
           </a:p>
           <a:p>
@@ -9231,19 +9179,49 @@
             </a:pPr>
             <a:r>
               <a:rPr lang="pt-BR" b="1" dirty="0"/>
-              <a:t>Alfa</a:t>
+              <a:t>Beta</a:t>
             </a:r>
             <a:r>
               <a:rPr lang="pt-BR" dirty="0"/>
-              <a:t>: funcionalidade chave da jogabilidade é implementada, os </a:t>
-            </a:r>
-            <a:r>
-              <a:rPr lang="pt-BR" dirty="0" err="1"/>
+              <a:t>: código e </a:t>
+            </a:r>
+            <a:r>
+              <a:rPr lang="pt-BR" i="1" dirty="0" err="1"/>
               <a:t>assets</a:t>
             </a:r>
             <a:r>
               <a:rPr lang="pt-BR" dirty="0"/>
-              <a:t> estão 40-50% concluídos, o jogo está sendo executado na plataforma de hardware correta;</a:t>
+              <a:t> concluídos. Arte, Design e Engenharia dedicadas à correção de bugs; e</a:t>
+            </a:r>
+          </a:p>
+          <a:p>
+            <a:pPr marL="457200" indent="-457200" algn="l">
+              <a:buFont typeface="Arial" panose="020B0604020202020204" pitchFamily="34" charset="0"/>
+              <a:buChar char="•"/>
+            </a:pPr>
+            <a:r>
+              <a:rPr lang="pt-BR" b="1" dirty="0"/>
+              <a:t>Código candidato à liberação</a:t>
+            </a:r>
+            <a:r>
+              <a:rPr lang="pt-BR" dirty="0"/>
+              <a:t>: “todos os </a:t>
+            </a:r>
+            <a:r>
+              <a:rPr lang="pt-BR" i="1" dirty="0"/>
+              <a:t>bugs</a:t>
+            </a:r>
+            <a:r>
+              <a:rPr lang="pt-BR" dirty="0"/>
+              <a:t>” foram eliminados. A </a:t>
+            </a:r>
+            <a:r>
+              <a:rPr lang="pt-BR" i="1" dirty="0"/>
+              <a:t>build</a:t>
+            </a:r>
+            <a:r>
+              <a:rPr lang="pt-BR" dirty="0"/>
+              <a:t> está pronta para ser entregue ou enviada para o fabricante do console para aprovação.</a:t>
             </a:r>
           </a:p>
         </p:txBody>
@@ -9251,7 +9229,7 @@
     </p:spTree>
     <p:extLst>
       <p:ext uri="{BB962C8B-B14F-4D97-AF65-F5344CB8AC3E}">
-        <p14:creationId xmlns:p14="http://schemas.microsoft.com/office/powerpoint/2010/main" val="2001992897"/>
+        <p14:creationId xmlns:p14="http://schemas.microsoft.com/office/powerpoint/2010/main" val="2508318109"/>
       </p:ext>
     </p:extLst>
   </p:cSld>
@@ -9295,11 +9273,11 @@
           <a:p>
             <a:r>
               <a:rPr lang="pt-BR" dirty="0"/>
-              <a:t>Definição das </a:t>
+              <a:t>Definição </a:t>
             </a:r>
             <a:r>
               <a:rPr lang="pt-BR" dirty="0" smtClean="0"/>
-              <a:t>Etapas</a:t>
+              <a:t>dos Produtos</a:t>
             </a:r>
             <a:endParaRPr lang="pt-BR" dirty="0"/>
           </a:p>
@@ -9327,17 +9305,27 @@
           </a:bodyPr>
           <a:lstStyle/>
           <a:p>
+            <a:r>
+              <a:rPr lang="pt-BR" dirty="0" smtClean="0"/>
+              <a:t>Defina os produtos esperados a cada etapa com o máximo de detalhes. Use categorias como as seguintes (veja um exemplo </a:t>
+            </a:r>
+            <a:r>
+              <a:rPr lang="pt-BR" dirty="0"/>
+              <a:t>em Chandler, H. M</a:t>
+            </a:r>
+            <a:r>
+              <a:rPr lang="pt-BR" dirty="0" smtClean="0"/>
+              <a:t>. 2012, p. 244):</a:t>
+            </a:r>
+          </a:p>
+          <a:p>
             <a:pPr marL="457200" indent="-457200" algn="l">
               <a:buFont typeface="Arial" panose="020B0604020202020204" pitchFamily="34" charset="0"/>
               <a:buChar char="•"/>
             </a:pPr>
             <a:r>
-              <a:rPr lang="pt-BR" b="1" dirty="0"/>
-              <a:t>Congelamento de código</a:t>
-            </a:r>
-            <a:r>
-              <a:rPr lang="pt-BR" dirty="0"/>
-              <a:t>: código do jogo concluído e os programadores apenas corrigirão bugs;</a:t>
+              <a:rPr lang="pt-BR" dirty="0" smtClean="0"/>
+              <a:t>Personagens, objetos, níveis;</a:t>
             </a:r>
           </a:p>
           <a:p>
@@ -9346,20 +9334,8 @@
               <a:buChar char="•"/>
             </a:pPr>
             <a:r>
-              <a:rPr lang="pt-BR" b="1" dirty="0"/>
-              <a:t>Beta</a:t>
-            </a:r>
-            <a:r>
-              <a:rPr lang="pt-BR" dirty="0"/>
-              <a:t>: código e </a:t>
-            </a:r>
-            <a:r>
-              <a:rPr lang="pt-BR" i="1" dirty="0" err="1"/>
-              <a:t>assets</a:t>
-            </a:r>
-            <a:r>
-              <a:rPr lang="pt-BR" dirty="0"/>
-              <a:t> concluídos. Arte, Design e Engenharia dedicadas à correção de bugs; e</a:t>
+              <a:rPr lang="pt-BR" dirty="0" smtClean="0"/>
+              <a:t>Cinemática;</a:t>
             </a:r>
           </a:p>
           <a:p>
@@ -9368,36 +9344,35 @@
               <a:buChar char="•"/>
             </a:pPr>
             <a:r>
-              <a:rPr lang="pt-BR" b="1" dirty="0"/>
-              <a:t>Código candidato à liberação</a:t>
-            </a:r>
-            <a:r>
-              <a:rPr lang="pt-BR" dirty="0"/>
-              <a:t>: “todos os </a:t>
-            </a:r>
-            <a:r>
-              <a:rPr lang="pt-BR" i="1" dirty="0"/>
-              <a:t>bugs</a:t>
-            </a:r>
-            <a:r>
-              <a:rPr lang="pt-BR" dirty="0"/>
-              <a:t>” foram eliminados. A </a:t>
-            </a:r>
-            <a:r>
-              <a:rPr lang="pt-BR" i="1" dirty="0"/>
-              <a:t>build</a:t>
-            </a:r>
-            <a:r>
-              <a:rPr lang="pt-BR" dirty="0"/>
-              <a:t> está pronta para ser entregue ou enviada para o fabricante do console para aprovação.</a:t>
-            </a:r>
+              <a:rPr lang="pt-BR" dirty="0" smtClean="0"/>
+              <a:t>Recursos de </a:t>
+            </a:r>
+            <a:r>
+              <a:rPr lang="pt-BR" dirty="0" err="1" smtClean="0"/>
+              <a:t>jogabilidade</a:t>
+            </a:r>
+            <a:r>
+              <a:rPr lang="pt-BR" dirty="0" smtClean="0"/>
+              <a:t>;</a:t>
+            </a:r>
+          </a:p>
+          <a:p>
+            <a:pPr marL="457200" indent="-457200" algn="l">
+              <a:buFont typeface="Arial" panose="020B0604020202020204" pitchFamily="34" charset="0"/>
+              <a:buChar char="•"/>
+            </a:pPr>
+            <a:r>
+              <a:rPr lang="pt-BR" dirty="0" smtClean="0"/>
+              <a:t>Recursos de engenharia;</a:t>
+            </a:r>
+            <a:endParaRPr lang="pt-BR" dirty="0"/>
           </a:p>
         </p:txBody>
       </p:sp>
     </p:spTree>
     <p:extLst>
       <p:ext uri="{BB962C8B-B14F-4D97-AF65-F5344CB8AC3E}">
-        <p14:creationId xmlns:p14="http://schemas.microsoft.com/office/powerpoint/2010/main" val="2508318109"/>
+        <p14:creationId xmlns:p14="http://schemas.microsoft.com/office/powerpoint/2010/main" val="2799828126"/>
       </p:ext>
     </p:extLst>
   </p:cSld>
@@ -9473,27 +9448,13 @@
           </a:bodyPr>
           <a:lstStyle/>
           <a:p>
-            <a:r>
-              <a:rPr lang="pt-BR" dirty="0" smtClean="0"/>
-              <a:t>Defina os produtos esperados a cada etapa com o máximo de detalhes. Use categorias como as seguintes (veja um exemplo </a:t>
-            </a:r>
-            <a:r>
-              <a:rPr lang="pt-BR" dirty="0"/>
-              <a:t>em Chandler, H. M</a:t>
-            </a:r>
-            <a:r>
-              <a:rPr lang="pt-BR" dirty="0" smtClean="0"/>
-              <a:t>. 2012, p. 244):</a:t>
-            </a:r>
-          </a:p>
-          <a:p>
             <a:pPr marL="457200" indent="-457200" algn="l">
               <a:buFont typeface="Arial" panose="020B0604020202020204" pitchFamily="34" charset="0"/>
               <a:buChar char="•"/>
             </a:pPr>
             <a:r>
               <a:rPr lang="pt-BR" dirty="0" smtClean="0"/>
-              <a:t>Personagens, objetos, níveis;</a:t>
+              <a:t>IU (interface de usuário);</a:t>
             </a:r>
           </a:p>
           <a:p>
@@ -9503,7 +9464,7 @@
             </a:pPr>
             <a:r>
               <a:rPr lang="pt-BR" dirty="0" smtClean="0"/>
-              <a:t>Cinemática;</a:t>
+              <a:t>Som;</a:t>
             </a:r>
           </a:p>
           <a:p>
@@ -9513,15 +9474,7 @@
             </a:pPr>
             <a:r>
               <a:rPr lang="pt-BR" dirty="0" smtClean="0"/>
-              <a:t>Recursos de </a:t>
-            </a:r>
-            <a:r>
-              <a:rPr lang="pt-BR" dirty="0" err="1" smtClean="0"/>
-              <a:t>jogabilidade</a:t>
-            </a:r>
-            <a:r>
-              <a:rPr lang="pt-BR" dirty="0" smtClean="0"/>
-              <a:t>;</a:t>
+              <a:t>Localização;</a:t>
             </a:r>
           </a:p>
           <a:p>
@@ -9531,7 +9484,17 @@
             </a:pPr>
             <a:r>
               <a:rPr lang="pt-BR" dirty="0" smtClean="0"/>
-              <a:t>Recursos de engenharia;</a:t>
+              <a:t>Roteiro; e</a:t>
+            </a:r>
+          </a:p>
+          <a:p>
+            <a:pPr marL="457200" indent="-457200" algn="l">
+              <a:buFont typeface="Arial" panose="020B0604020202020204" pitchFamily="34" charset="0"/>
+              <a:buChar char="•"/>
+            </a:pPr>
+            <a:r>
+              <a:rPr lang="pt-BR" dirty="0" smtClean="0"/>
+              <a:t>Geral.</a:t>
             </a:r>
             <a:endParaRPr lang="pt-BR" dirty="0"/>
           </a:p>
@@ -9540,7 +9503,7 @@
     </p:spTree>
     <p:extLst>
       <p:ext uri="{BB962C8B-B14F-4D97-AF65-F5344CB8AC3E}">
-        <p14:creationId xmlns:p14="http://schemas.microsoft.com/office/powerpoint/2010/main" val="2799828126"/>
+        <p14:creationId xmlns:p14="http://schemas.microsoft.com/office/powerpoint/2010/main" val="1743488672"/>
       </p:ext>
     </p:extLst>
   </p:cSld>
@@ -9583,12 +9546,8 @@
           <a:lstStyle/>
           <a:p>
             <a:r>
-              <a:rPr lang="pt-BR" dirty="0"/>
-              <a:t>Definição </a:t>
-            </a:r>
-            <a:r>
               <a:rPr lang="pt-BR" dirty="0" smtClean="0"/>
-              <a:t>dos Produtos</a:t>
+              <a:t>Avaliação da Tecnologia</a:t>
             </a:r>
             <a:endParaRPr lang="pt-BR" dirty="0"/>
           </a:p>
@@ -9616,53 +9575,17 @@
           </a:bodyPr>
           <a:lstStyle/>
           <a:p>
-            <a:pPr marL="457200" indent="-457200" algn="l">
-              <a:buFont typeface="Arial" panose="020B0604020202020204" pitchFamily="34" charset="0"/>
-              <a:buChar char="•"/>
-            </a:pPr>
             <a:r>
               <a:rPr lang="pt-BR" dirty="0" smtClean="0"/>
-              <a:t>IU (interface de usuário);</a:t>
-            </a:r>
-          </a:p>
-          <a:p>
-            <a:pPr marL="457200" indent="-457200" algn="l">
-              <a:buFont typeface="Arial" panose="020B0604020202020204" pitchFamily="34" charset="0"/>
-              <a:buChar char="•"/>
-            </a:pPr>
+              <a:t>Decidir sobre o mecanismo de jogo, ferramentas de arte, ferramentas de </a:t>
+            </a:r>
+            <a:r>
+              <a:rPr lang="pt-BR" i="1" dirty="0" smtClean="0"/>
+              <a:t>script</a:t>
+            </a:r>
             <a:r>
               <a:rPr lang="pt-BR" dirty="0" smtClean="0"/>
-              <a:t>Som;</a:t>
-            </a:r>
-          </a:p>
-          <a:p>
-            <a:pPr marL="457200" indent="-457200" algn="l">
-              <a:buFont typeface="Arial" panose="020B0604020202020204" pitchFamily="34" charset="0"/>
-              <a:buChar char="•"/>
-            </a:pPr>
-            <a:r>
-              <a:rPr lang="pt-BR" dirty="0" smtClean="0"/>
-              <a:t>Localização;</a:t>
-            </a:r>
-          </a:p>
-          <a:p>
-            <a:pPr marL="457200" indent="-457200" algn="l">
-              <a:buFont typeface="Arial" panose="020B0604020202020204" pitchFamily="34" charset="0"/>
-              <a:buChar char="•"/>
-            </a:pPr>
-            <a:r>
-              <a:rPr lang="pt-BR" dirty="0" smtClean="0"/>
-              <a:t>Roteiro; e</a:t>
-            </a:r>
-          </a:p>
-          <a:p>
-            <a:pPr marL="457200" indent="-457200" algn="l">
-              <a:buFont typeface="Arial" panose="020B0604020202020204" pitchFamily="34" charset="0"/>
-              <a:buChar char="•"/>
-            </a:pPr>
-            <a:r>
-              <a:rPr lang="pt-BR" dirty="0" smtClean="0"/>
-              <a:t>Geral.</a:t>
+              <a:t>, sistemas de IA, sistemas de física e outros elementos técnicos que são necessários para fornecer a funcionalidade desejada.</a:t>
             </a:r>
             <a:endParaRPr lang="pt-BR" dirty="0"/>
           </a:p>
@@ -9671,7 +9594,7 @@
     </p:spTree>
     <p:extLst>
       <p:ext uri="{BB962C8B-B14F-4D97-AF65-F5344CB8AC3E}">
-        <p14:creationId xmlns:p14="http://schemas.microsoft.com/office/powerpoint/2010/main" val="1743488672"/>
+        <p14:creationId xmlns:p14="http://schemas.microsoft.com/office/powerpoint/2010/main" val="3247754941"/>
       </p:ext>
     </p:extLst>
   </p:cSld>
@@ -9715,7 +9638,7 @@
           <a:p>
             <a:r>
               <a:rPr lang="pt-BR" dirty="0" smtClean="0"/>
-              <a:t>Avaliação da Tecnologia</a:t>
+              <a:t>Definição das Ferramentas</a:t>
             </a:r>
             <a:endParaRPr lang="pt-BR" dirty="0"/>
           </a:p>
@@ -9743,17 +9666,125 @@
           </a:bodyPr>
           <a:lstStyle/>
           <a:p>
+            <a:pPr marL="457200" indent="-457200" algn="l">
+              <a:buFont typeface="Arial" panose="020B0604020202020204" pitchFamily="34" charset="0"/>
+              <a:buChar char="•"/>
+            </a:pPr>
+            <a:r>
+              <a:rPr lang="pt-BR" b="1" dirty="0" err="1" smtClean="0"/>
+              <a:t>Unity</a:t>
+            </a:r>
             <a:r>
               <a:rPr lang="pt-BR" dirty="0" smtClean="0"/>
-              <a:t>Decidir sobre o mecanismo de jogo, ferramentas de arte, ferramentas de </a:t>
+              <a:t>: gerenciamento de </a:t>
+            </a:r>
+            <a:r>
+              <a:rPr lang="pt-BR" i="1" dirty="0" err="1" smtClean="0"/>
+              <a:t>assets</a:t>
+            </a:r>
+            <a:r>
+              <a:rPr lang="pt-BR" dirty="0" smtClean="0"/>
+              <a:t> e geração de </a:t>
             </a:r>
             <a:r>
               <a:rPr lang="pt-BR" i="1" dirty="0" smtClean="0"/>
-              <a:t>script</a:t>
+              <a:t>builds</a:t>
             </a:r>
             <a:r>
               <a:rPr lang="pt-BR" dirty="0" smtClean="0"/>
-              <a:t>, sistemas de IA, sistemas de física e outros elementos técnicos que são necessários para fornecer a funcionalidade desejada.</a:t>
+              <a:t>;</a:t>
+            </a:r>
+          </a:p>
+          <a:p>
+            <a:pPr marL="457200" indent="-457200" algn="l">
+              <a:buFont typeface="Arial" panose="020B0604020202020204" pitchFamily="34" charset="0"/>
+              <a:buChar char="•"/>
+            </a:pPr>
+            <a:r>
+              <a:rPr lang="pt-BR" b="1" dirty="0" smtClean="0"/>
+              <a:t>Visual Studio</a:t>
+            </a:r>
+            <a:r>
+              <a:rPr lang="pt-BR" dirty="0" smtClean="0"/>
+              <a:t>: desenvolvimento de </a:t>
+            </a:r>
+            <a:r>
+              <a:rPr lang="pt-BR" i="1" dirty="0" smtClean="0"/>
+              <a:t>scripts</a:t>
+            </a:r>
+            <a:r>
+              <a:rPr lang="pt-BR" dirty="0" smtClean="0"/>
+              <a:t>;</a:t>
+            </a:r>
+          </a:p>
+          <a:p>
+            <a:pPr marL="457200" indent="-457200" algn="l">
+              <a:buFont typeface="Arial" panose="020B0604020202020204" pitchFamily="34" charset="0"/>
+              <a:buChar char="•"/>
+            </a:pPr>
+            <a:r>
+              <a:rPr lang="pt-BR" b="1" dirty="0" smtClean="0"/>
+              <a:t>Photoshop e </a:t>
+            </a:r>
+            <a:r>
+              <a:rPr lang="pt-BR" b="1" dirty="0" err="1" smtClean="0"/>
+              <a:t>Illustrator</a:t>
+            </a:r>
+            <a:r>
+              <a:rPr lang="pt-BR" dirty="0" smtClean="0"/>
+              <a:t>: criação de </a:t>
+            </a:r>
+            <a:r>
+              <a:rPr lang="pt-BR" i="1" dirty="0" err="1" smtClean="0"/>
+              <a:t>assets</a:t>
+            </a:r>
+            <a:r>
+              <a:rPr lang="pt-BR" dirty="0" smtClean="0"/>
+              <a:t> 2D;</a:t>
+            </a:r>
+          </a:p>
+          <a:p>
+            <a:pPr marL="457200" indent="-457200" algn="l">
+              <a:buFont typeface="Arial" panose="020B0604020202020204" pitchFamily="34" charset="0"/>
+              <a:buChar char="•"/>
+            </a:pPr>
+            <a:r>
+              <a:rPr lang="pt-BR" b="1" dirty="0" smtClean="0"/>
+              <a:t>3ds Max</a:t>
+            </a:r>
+            <a:r>
+              <a:rPr lang="pt-BR" dirty="0" smtClean="0"/>
+              <a:t>: criação de </a:t>
+            </a:r>
+            <a:r>
+              <a:rPr lang="pt-BR" i="1" dirty="0" err="1" smtClean="0"/>
+              <a:t>assets</a:t>
+            </a:r>
+            <a:r>
+              <a:rPr lang="pt-BR" dirty="0" smtClean="0"/>
+              <a:t> 3D; e</a:t>
+            </a:r>
+          </a:p>
+          <a:p>
+            <a:pPr marL="457200" indent="-457200" algn="l">
+              <a:buFont typeface="Arial" panose="020B0604020202020204" pitchFamily="34" charset="0"/>
+              <a:buChar char="•"/>
+            </a:pPr>
+            <a:r>
+              <a:rPr lang="pt-BR" b="1" dirty="0" err="1" smtClean="0"/>
+              <a:t>Audacity</a:t>
+            </a:r>
+            <a:r>
+              <a:rPr lang="pt-BR" dirty="0" smtClean="0"/>
+              <a:t>: criação e edição de </a:t>
+            </a:r>
+            <a:r>
+              <a:rPr lang="pt-BR" i="1" dirty="0" err="1" smtClean="0"/>
+              <a:t>assets</a:t>
+            </a:r>
+            <a:r>
+              <a:rPr lang="pt-BR" dirty="0" smtClean="0"/>
+              <a:t> de áudio.</a:t>
             </a:r>
             <a:endParaRPr lang="pt-BR" dirty="0"/>
           </a:p>
@@ -9762,7 +9793,7 @@
     </p:spTree>
     <p:extLst>
       <p:ext uri="{BB962C8B-B14F-4D97-AF65-F5344CB8AC3E}">
-        <p14:creationId xmlns:p14="http://schemas.microsoft.com/office/powerpoint/2010/main" val="3247754941"/>
+        <p14:creationId xmlns:p14="http://schemas.microsoft.com/office/powerpoint/2010/main" val="1064410626"/>
       </p:ext>
     </p:extLst>
   </p:cSld>
@@ -9871,205 +9902,6 @@
 </file>
 
 <file path=ppt/slides/slide20.xml><?xml version="1.0" encoding="utf-8"?>
-<p:sld xmlns:a="http://schemas.openxmlformats.org/drawingml/2006/main" xmlns:r="http://schemas.openxmlformats.org/officeDocument/2006/relationships" xmlns:p="http://schemas.openxmlformats.org/presentationml/2006/main">
-  <p:cSld>
-    <p:spTree>
-      <p:nvGrpSpPr>
-        <p:cNvPr id="1" name=""/>
-        <p:cNvGrpSpPr/>
-        <p:nvPr/>
-      </p:nvGrpSpPr>
-      <p:grpSpPr>
-        <a:xfrm>
-          <a:off x="0" y="0"/>
-          <a:ext cx="0" cy="0"/>
-          <a:chOff x="0" y="0"/>
-          <a:chExt cx="0" cy="0"/>
-        </a:xfrm>
-      </p:grpSpPr>
-      <p:sp>
-        <p:nvSpPr>
-          <p:cNvPr id="5" name="Título 4"/>
-          <p:cNvSpPr>
-            <a:spLocks noGrp="1"/>
-          </p:cNvSpPr>
-          <p:nvPr>
-            <p:ph type="title"/>
-          </p:nvPr>
-        </p:nvSpPr>
-        <p:spPr/>
-        <p:txBody>
-          <a:bodyPr/>
-          <a:lstStyle/>
-          <a:p>
-            <a:r>
-              <a:rPr lang="pt-BR" dirty="0" smtClean="0"/>
-              <a:t>Definição das Ferramentas</a:t>
-            </a:r>
-            <a:endParaRPr lang="pt-BR" dirty="0"/>
-          </a:p>
-        </p:txBody>
-      </p:sp>
-      <p:sp>
-        <p:nvSpPr>
-          <p:cNvPr id="6" name="Espaço Reservado para Conteúdo 5"/>
-          <p:cNvSpPr>
-            <a:spLocks noGrp="1"/>
-          </p:cNvSpPr>
-          <p:nvPr>
-            <p:ph idx="1"/>
-          </p:nvPr>
-        </p:nvSpPr>
-        <p:spPr>
-          <a:xfrm>
-            <a:off x="317694" y="1291052"/>
-            <a:ext cx="11705493" cy="4930133"/>
-          </a:xfrm>
-        </p:spPr>
-        <p:txBody>
-          <a:bodyPr>
-            <a:normAutofit/>
-          </a:bodyPr>
-          <a:lstStyle/>
-          <a:p>
-            <a:pPr marL="457200" indent="-457200" algn="l">
-              <a:buFont typeface="Arial" panose="020B0604020202020204" pitchFamily="34" charset="0"/>
-              <a:buChar char="•"/>
-            </a:pPr>
-            <a:r>
-              <a:rPr lang="pt-BR" b="1" dirty="0" err="1" smtClean="0"/>
-              <a:t>Unity</a:t>
-            </a:r>
-            <a:r>
-              <a:rPr lang="pt-BR" dirty="0" smtClean="0"/>
-              <a:t>: gerenciamento de </a:t>
-            </a:r>
-            <a:r>
-              <a:rPr lang="pt-BR" i="1" dirty="0" err="1" smtClean="0"/>
-              <a:t>assets</a:t>
-            </a:r>
-            <a:r>
-              <a:rPr lang="pt-BR" dirty="0" smtClean="0"/>
-              <a:t> e geração de </a:t>
-            </a:r>
-            <a:r>
-              <a:rPr lang="pt-BR" i="1" dirty="0" smtClean="0"/>
-              <a:t>builds</a:t>
-            </a:r>
-            <a:r>
-              <a:rPr lang="pt-BR" dirty="0" smtClean="0"/>
-              <a:t>;</a:t>
-            </a:r>
-          </a:p>
-          <a:p>
-            <a:pPr marL="457200" indent="-457200" algn="l">
-              <a:buFont typeface="Arial" panose="020B0604020202020204" pitchFamily="34" charset="0"/>
-              <a:buChar char="•"/>
-            </a:pPr>
-            <a:r>
-              <a:rPr lang="pt-BR" b="1" dirty="0" smtClean="0"/>
-              <a:t>Visual Studio</a:t>
-            </a:r>
-            <a:r>
-              <a:rPr lang="pt-BR" dirty="0" smtClean="0"/>
-              <a:t>: desenvolvimento de </a:t>
-            </a:r>
-            <a:r>
-              <a:rPr lang="pt-BR" i="1" dirty="0" smtClean="0"/>
-              <a:t>scripts</a:t>
-            </a:r>
-            <a:r>
-              <a:rPr lang="pt-BR" dirty="0" smtClean="0"/>
-              <a:t>;</a:t>
-            </a:r>
-          </a:p>
-          <a:p>
-            <a:pPr marL="457200" indent="-457200" algn="l">
-              <a:buFont typeface="Arial" panose="020B0604020202020204" pitchFamily="34" charset="0"/>
-              <a:buChar char="•"/>
-            </a:pPr>
-            <a:r>
-              <a:rPr lang="pt-BR" b="1" dirty="0" smtClean="0"/>
-              <a:t>Photoshop e </a:t>
-            </a:r>
-            <a:r>
-              <a:rPr lang="pt-BR" b="1" dirty="0" err="1" smtClean="0"/>
-              <a:t>Illustrator</a:t>
-            </a:r>
-            <a:r>
-              <a:rPr lang="pt-BR" dirty="0" smtClean="0"/>
-              <a:t>: criação de </a:t>
-            </a:r>
-            <a:r>
-              <a:rPr lang="pt-BR" i="1" dirty="0" err="1" smtClean="0"/>
-              <a:t>assets</a:t>
-            </a:r>
-            <a:r>
-              <a:rPr lang="pt-BR" dirty="0" smtClean="0"/>
-              <a:t> 2D;</a:t>
-            </a:r>
-          </a:p>
-          <a:p>
-            <a:pPr marL="457200" indent="-457200" algn="l">
-              <a:buFont typeface="Arial" panose="020B0604020202020204" pitchFamily="34" charset="0"/>
-              <a:buChar char="•"/>
-            </a:pPr>
-            <a:r>
-              <a:rPr lang="pt-BR" b="1" dirty="0" smtClean="0"/>
-              <a:t>3ds Max</a:t>
-            </a:r>
-            <a:r>
-              <a:rPr lang="pt-BR" dirty="0" smtClean="0"/>
-              <a:t>: criação de </a:t>
-            </a:r>
-            <a:r>
-              <a:rPr lang="pt-BR" i="1" dirty="0" err="1" smtClean="0"/>
-              <a:t>assets</a:t>
-            </a:r>
-            <a:r>
-              <a:rPr lang="pt-BR" dirty="0" smtClean="0"/>
-              <a:t> 3D; e</a:t>
-            </a:r>
-          </a:p>
-          <a:p>
-            <a:pPr marL="457200" indent="-457200" algn="l">
-              <a:buFont typeface="Arial" panose="020B0604020202020204" pitchFamily="34" charset="0"/>
-              <a:buChar char="•"/>
-            </a:pPr>
-            <a:r>
-              <a:rPr lang="pt-BR" b="1" dirty="0" err="1" smtClean="0"/>
-              <a:t>Audacity</a:t>
-            </a:r>
-            <a:r>
-              <a:rPr lang="pt-BR" dirty="0" smtClean="0"/>
-              <a:t>: criação e edição de </a:t>
-            </a:r>
-            <a:r>
-              <a:rPr lang="pt-BR" i="1" dirty="0" err="1" smtClean="0"/>
-              <a:t>assets</a:t>
-            </a:r>
-            <a:r>
-              <a:rPr lang="pt-BR" dirty="0" smtClean="0"/>
-              <a:t> de áudio.</a:t>
-            </a:r>
-            <a:endParaRPr lang="pt-BR" dirty="0"/>
-          </a:p>
-        </p:txBody>
-      </p:sp>
-    </p:spTree>
-    <p:extLst>
-      <p:ext uri="{BB962C8B-B14F-4D97-AF65-F5344CB8AC3E}">
-        <p14:creationId xmlns:p14="http://schemas.microsoft.com/office/powerpoint/2010/main" val="1064410626"/>
-      </p:ext>
-    </p:extLst>
-  </p:cSld>
-  <p:clrMapOvr>
-    <a:masterClrMapping/>
-  </p:clrMapOvr>
-</p:sld>
-</file>
-
-<file path=ppt/slides/slide21.xml><?xml version="1.0" encoding="utf-8"?>
 <p:sld xmlns:a="http://schemas.openxmlformats.org/drawingml/2006/main" xmlns:r="http://schemas.openxmlformats.org/officeDocument/2006/relationships" xmlns:p="http://schemas.openxmlformats.org/presentationml/2006/main">
   <p:cSld>
     <p:spTree>
@@ -10839,7 +10671,7 @@
           <a:p>
             <a:r>
               <a:rPr lang="pt-BR" dirty="0"/>
-              <a:t>Jogo Exemplo</a:t>
+              <a:t>Requisitos do Jogo</a:t>
             </a:r>
           </a:p>
         </p:txBody>
@@ -10863,14 +10695,7 @@
           <a:p>
             <a:r>
               <a:rPr lang="pt-BR" dirty="0"/>
-              <a:t>Para exemplificar o resultado de cada etapa que compõe a definição dos requisitos de um jogo, será usado como exemplo um jogo derivado do Jogo da Velha chamado</a:t>
-            </a:r>
-            <a:br>
-              <a:rPr lang="pt-BR" dirty="0"/>
-            </a:br>
-            <a:r>
-              <a:rPr lang="pt-BR" dirty="0"/>
-              <a:t>Jogo da WHIP.</a:t>
+              <a:t>Detalham como o conceito será transformado em um jogo real. São tomadas decisões sobre os principais objetivos do projeto, o conjunto básico de recursos, os produtos das etapas, a tecnologia básica e o pipeline de produção.</a:t>
             </a:r>
           </a:p>
         </p:txBody>
@@ -10878,7 +10703,7 @@
     </p:spTree>
     <p:extLst>
       <p:ext uri="{BB962C8B-B14F-4D97-AF65-F5344CB8AC3E}">
-        <p14:creationId xmlns:p14="http://schemas.microsoft.com/office/powerpoint/2010/main" val="593311015"/>
+        <p14:creationId xmlns:p14="http://schemas.microsoft.com/office/powerpoint/2010/main" val="1256872412"/>
       </p:ext>
     </p:extLst>
   </p:cSld>

</xml_diff>